<commit_message>
Updated purpose of $expand
</commit_message>
<xml_diff>
--- a/presentations/2025-04-DaVinci/Event/Terminology Translation Mapping Clinical and Administrative Codes.pptx
+++ b/presentations/2025-04-DaVinci/Event/Terminology Translation Mapping Clinical and Administrative Codes.pptx
@@ -6889,7 +6889,15 @@
             <a:pPr lvl="1"/>
             <a:r>
               <a:rPr lang="en-CA" dirty="0"/>
-              <a:t>Allows finding all codes that are specializations of another</a:t>
+              <a:t>Allows finding all codes that are specializations </a:t>
+            </a:r>
+            <a:r>
+              <a:rPr lang="en-CA"/>
+              <a:t>or generalizations </a:t>
+            </a:r>
+            <a:r>
+              <a:rPr lang="en-CA" dirty="0"/>
+              <a:t>of another</a:t>
             </a:r>
           </a:p>
           <a:p>
@@ -7869,6 +7877,64 @@
 </file>
 
 <file path=customXml/item1.xml><?xml version="1.0" encoding="utf-8"?>
+<p:properties xmlns:p="http://schemas.microsoft.com/office/2006/metadata/properties" xmlns:xsi="http://www.w3.org/2001/XMLSchema-instance" xmlns:pc="http://schemas.microsoft.com/office/infopath/2007/PartnerControls">
+  <documentManagement>
+    <SharedWithUsers xmlns="cf5a87e6-8225-499d-8aa7-664ff23f0528">
+      <UserInfo>
+        <DisplayName>Kathy Moncelsi</DisplayName>
+        <AccountId>117</AccountId>
+        <AccountType/>
+      </UserInfo>
+      <UserInfo>
+        <DisplayName>Vanessa Candelora</DisplayName>
+        <AccountId>7525</AccountId>
+        <AccountType/>
+      </UserInfo>
+      <UserInfo>
+        <DisplayName>Phung Matthews</DisplayName>
+        <AccountId>7256</AccountId>
+        <AccountType/>
+      </UserInfo>
+      <UserInfo>
+        <DisplayName>Jordyn King</DisplayName>
+        <AccountId>6166</AccountId>
+        <AccountType/>
+      </UserInfo>
+      <UserInfo>
+        <DisplayName>Pooja Babbrah</DisplayName>
+        <AccountId>63</AccountId>
+        <AccountType/>
+      </UserInfo>
+      <UserInfo>
+        <DisplayName>Frank McKinney</DisplayName>
+        <AccountId>6074</AccountId>
+        <AccountType/>
+      </UserInfo>
+      <UserInfo>
+        <DisplayName>Amy Johnson</DisplayName>
+        <AccountId>281</AccountId>
+        <AccountType/>
+      </UserInfo>
+      <UserInfo>
+        <DisplayName>Michael Solomon</DisplayName>
+        <AccountId>78</AccountId>
+        <AccountType/>
+      </UserInfo>
+      <UserInfo>
+        <DisplayName>Tony Schueth</DisplayName>
+        <AccountId>24</AccountId>
+        <AccountType/>
+      </UserInfo>
+    </SharedWithUsers>
+    <TaxCatchAll xmlns="cf5a87e6-8225-499d-8aa7-664ff23f0528" xsi:nil="true"/>
+    <lcf76f155ced4ddcb4097134ff3c332f xmlns="9f94fe76-4e69-4a06-93ce-361b54a8e543">
+      <Terms xmlns="http://schemas.microsoft.com/office/infopath/2007/PartnerControls"/>
+    </lcf76f155ced4ddcb4097134ff3c332f>
+  </documentManagement>
+</p:properties>
+</file>
+
+<file path=customXml/item2.xml><?xml version="1.0" encoding="utf-8"?>
 <ct:contentTypeSchema xmlns:ct="http://schemas.microsoft.com/office/2006/metadata/contentType" xmlns:ma="http://schemas.microsoft.com/office/2006/metadata/properties/metaAttributes" ct:_="" ma:_="" ma:contentTypeName="Document" ma:contentTypeID="0x0101002C8FC9818E7A2340A2B524F46111FD15" ma:contentTypeVersion="19" ma:contentTypeDescription="Create a new document." ma:contentTypeScope="" ma:versionID="7ef9a8bc46a14bfd553da3a3e6695c4d">
   <xsd:schema xmlns:xsd="http://www.w3.org/2001/XMLSchema" xmlns:xs="http://www.w3.org/2001/XMLSchema" xmlns:p="http://schemas.microsoft.com/office/2006/metadata/properties" xmlns:ns2="9f94fe76-4e69-4a06-93ce-361b54a8e543" xmlns:ns3="cf5a87e6-8225-499d-8aa7-664ff23f0528" targetNamespace="http://schemas.microsoft.com/office/2006/metadata/properties" ma:root="true" ma:fieldsID="580938c8cdc1ed620302479102261575" ns2:_="" ns3:_="">
     <xsd:import namespace="9f94fe76-4e69-4a06-93ce-361b54a8e543"/>
@@ -8123,64 +8189,6 @@
 </ct:contentTypeSchema>
 </file>
 
-<file path=customXml/item2.xml><?xml version="1.0" encoding="utf-8"?>
-<p:properties xmlns:p="http://schemas.microsoft.com/office/2006/metadata/properties" xmlns:xsi="http://www.w3.org/2001/XMLSchema-instance" xmlns:pc="http://schemas.microsoft.com/office/infopath/2007/PartnerControls">
-  <documentManagement>
-    <SharedWithUsers xmlns="cf5a87e6-8225-499d-8aa7-664ff23f0528">
-      <UserInfo>
-        <DisplayName>Kathy Moncelsi</DisplayName>
-        <AccountId>117</AccountId>
-        <AccountType/>
-      </UserInfo>
-      <UserInfo>
-        <DisplayName>Vanessa Candelora</DisplayName>
-        <AccountId>7525</AccountId>
-        <AccountType/>
-      </UserInfo>
-      <UserInfo>
-        <DisplayName>Phung Matthews</DisplayName>
-        <AccountId>7256</AccountId>
-        <AccountType/>
-      </UserInfo>
-      <UserInfo>
-        <DisplayName>Jordyn King</DisplayName>
-        <AccountId>6166</AccountId>
-        <AccountType/>
-      </UserInfo>
-      <UserInfo>
-        <DisplayName>Pooja Babbrah</DisplayName>
-        <AccountId>63</AccountId>
-        <AccountType/>
-      </UserInfo>
-      <UserInfo>
-        <DisplayName>Frank McKinney</DisplayName>
-        <AccountId>6074</AccountId>
-        <AccountType/>
-      </UserInfo>
-      <UserInfo>
-        <DisplayName>Amy Johnson</DisplayName>
-        <AccountId>281</AccountId>
-        <AccountType/>
-      </UserInfo>
-      <UserInfo>
-        <DisplayName>Michael Solomon</DisplayName>
-        <AccountId>78</AccountId>
-        <AccountType/>
-      </UserInfo>
-      <UserInfo>
-        <DisplayName>Tony Schueth</DisplayName>
-        <AccountId>24</AccountId>
-        <AccountType/>
-      </UserInfo>
-    </SharedWithUsers>
-    <TaxCatchAll xmlns="cf5a87e6-8225-499d-8aa7-664ff23f0528" xsi:nil="true"/>
-    <lcf76f155ced4ddcb4097134ff3c332f xmlns="9f94fe76-4e69-4a06-93ce-361b54a8e543">
-      <Terms xmlns="http://schemas.microsoft.com/office/infopath/2007/PartnerControls"/>
-    </lcf76f155ced4ddcb4097134ff3c332f>
-  </documentManagement>
-</p:properties>
-</file>
-
 <file path=customXml/item3.xml><?xml version="1.0" encoding="utf-8"?>
 <?mso-contentType ?>
 <FormTemplates xmlns="http://schemas.microsoft.com/sharepoint/v3/contenttype/forms">
@@ -8191,6 +8199,23 @@
 </file>
 
 <file path=customXml/itemProps1.xml><?xml version="1.0" encoding="utf-8"?>
+<ds:datastoreItem xmlns:ds="http://schemas.openxmlformats.org/officeDocument/2006/customXml" ds:itemID="{ABC3541C-51DD-43E3-8C9A-56AC6823A20C}">
+  <ds:schemaRefs>
+    <ds:schemaRef ds:uri="9f94fe76-4e69-4a06-93ce-361b54a8e543"/>
+    <ds:schemaRef ds:uri="cf5a87e6-8225-499d-8aa7-664ff23f0528"/>
+    <ds:schemaRef ds:uri="http://purl.org/dc/dcmitype/"/>
+    <ds:schemaRef ds:uri="http://purl.org/dc/elements/1.1/"/>
+    <ds:schemaRef ds:uri="http://purl.org/dc/terms/"/>
+    <ds:schemaRef ds:uri="http://schemas.microsoft.com/office/2006/documentManagement/types"/>
+    <ds:schemaRef ds:uri="http://schemas.microsoft.com/office/2006/metadata/properties"/>
+    <ds:schemaRef ds:uri="http://schemas.microsoft.com/office/infopath/2007/PartnerControls"/>
+    <ds:schemaRef ds:uri="http://schemas.openxmlformats.org/package/2006/metadata/core-properties"/>
+    <ds:schemaRef ds:uri="http://www.w3.org/XML/1998/namespace"/>
+  </ds:schemaRefs>
+</ds:datastoreItem>
+</file>
+
+<file path=customXml/itemProps2.xml><?xml version="1.0" encoding="utf-8"?>
 <ds:datastoreItem xmlns:ds="http://schemas.openxmlformats.org/officeDocument/2006/customXml" ds:itemID="{75D6C950-6891-4B9F-8042-EAAA803A1D70}">
   <ds:schemaRefs>
     <ds:schemaRef ds:uri="9f94fe76-4e69-4a06-93ce-361b54a8e543"/>
@@ -8209,23 +8234,6 @@
 </ds:datastoreItem>
 </file>
 
-<file path=customXml/itemProps2.xml><?xml version="1.0" encoding="utf-8"?>
-<ds:datastoreItem xmlns:ds="http://schemas.openxmlformats.org/officeDocument/2006/customXml" ds:itemID="{ABC3541C-51DD-43E3-8C9A-56AC6823A20C}">
-  <ds:schemaRefs>
-    <ds:schemaRef ds:uri="9f94fe76-4e69-4a06-93ce-361b54a8e543"/>
-    <ds:schemaRef ds:uri="cf5a87e6-8225-499d-8aa7-664ff23f0528"/>
-    <ds:schemaRef ds:uri="http://purl.org/dc/dcmitype/"/>
-    <ds:schemaRef ds:uri="http://purl.org/dc/elements/1.1/"/>
-    <ds:schemaRef ds:uri="http://purl.org/dc/terms/"/>
-    <ds:schemaRef ds:uri="http://schemas.microsoft.com/office/2006/documentManagement/types"/>
-    <ds:schemaRef ds:uri="http://schemas.microsoft.com/office/2006/metadata/properties"/>
-    <ds:schemaRef ds:uri="http://schemas.microsoft.com/office/infopath/2007/PartnerControls"/>
-    <ds:schemaRef ds:uri="http://schemas.openxmlformats.org/package/2006/metadata/core-properties"/>
-    <ds:schemaRef ds:uri="http://www.w3.org/XML/1998/namespace"/>
-  </ds:schemaRefs>
-</ds:datastoreItem>
-</file>
-
 <file path=customXml/itemProps3.xml><?xml version="1.0" encoding="utf-8"?>
 <ds:datastoreItem xmlns:ds="http://schemas.openxmlformats.org/officeDocument/2006/customXml" ds:itemID="{0BA6B2E7-CD55-478D-BEC8-4794A5943CF4}">
   <ds:schemaRefs>

</xml_diff>